<commit_message>
Adicionando no PPTX e mudando erros de escrita na tela
</commit_message>
<xml_diff>
--- a/IODware.pptx
+++ b/IODware.pptx
@@ -7,11 +7,16 @@
   <p:sldIdLst>
     <p:sldId id="256" r:id="rId2"/>
     <p:sldId id="257" r:id="rId3"/>
-    <p:sldId id="258" r:id="rId4"/>
-    <p:sldId id="259" r:id="rId5"/>
-    <p:sldId id="260" r:id="rId6"/>
-    <p:sldId id="261" r:id="rId7"/>
-    <p:sldId id="262" r:id="rId8"/>
+    <p:sldId id="265" r:id="rId4"/>
+    <p:sldId id="266" r:id="rId5"/>
+    <p:sldId id="267" r:id="rId6"/>
+    <p:sldId id="258" r:id="rId7"/>
+    <p:sldId id="259" r:id="rId8"/>
+    <p:sldId id="260" r:id="rId9"/>
+    <p:sldId id="261" r:id="rId10"/>
+    <p:sldId id="263" r:id="rId11"/>
+    <p:sldId id="264" r:id="rId12"/>
+    <p:sldId id="262" r:id="rId13"/>
   </p:sldIdLst>
   <p:sldSz cx="12192000" cy="6858000"/>
   <p:notesSz cx="6858000" cy="9144000"/>
@@ -110,6 +115,11 @@
       </a:defRPr>
     </a:lvl9pPr>
   </p:defaultTextStyle>
+  <p:extLst>
+    <p:ext uri="{EFAFB233-063F-42B5-8137-9DF3F51BA10A}">
+      <p15:sldGuideLst xmlns:p15="http://schemas.microsoft.com/office/powerpoint/2012/main"/>
+    </p:ext>
+  </p:extLst>
 </p:presentation>
 </file>
 
@@ -208,7 +218,7 @@
           <a:effectLst/>
           <a:extLst>
             <a:ext uri="{91240B29-F687-4f45-9708-019B960494DF}">
-              <a14:hiddenLine xmlns:a14="http://schemas.microsoft.com/office/drawing/2010/main" xmlns="" w="9525">
+              <a14:hiddenLine xmlns="" xmlns:a14="http://schemas.microsoft.com/office/drawing/2010/main" w="9525">
                 <a:solidFill>
                   <a:srgbClr val="000000"/>
                 </a:solidFill>
@@ -401,7 +411,7 @@
             <a:fld id="{08B9EBBA-996F-894A-B54A-D6246ED52CEA}" type="datetimeFigureOut">
               <a:rPr lang="en-US" dirty="0"/>
               <a:pPr/>
-              <a:t>6/20/2019</a:t>
+              <a:t>6/26/2019</a:t>
             </a:fld>
             <a:endParaRPr lang="en-US" dirty="0"/>
           </a:p>
@@ -716,7 +726,7 @@
             <a:fld id="{18C79C5D-2A6F-F04D-97DA-BEF2467B64E4}" type="datetimeFigureOut">
               <a:rPr lang="en-US" dirty="0"/>
               <a:pPr/>
-              <a:t>6/20/2019</a:t>
+              <a:t>6/26/2019</a:t>
             </a:fld>
             <a:endParaRPr lang="en-US" dirty="0"/>
           </a:p>
@@ -1201,7 +1211,7 @@
             <a:fld id="{8DFA1846-DA80-1C48-A609-854EA85C59AD}" type="datetimeFigureOut">
               <a:rPr lang="en-US" dirty="0"/>
               <a:pPr/>
-              <a:t>6/20/2019</a:t>
+              <a:t>6/26/2019</a:t>
             </a:fld>
             <a:endParaRPr lang="en-US" dirty="0"/>
           </a:p>
@@ -1567,7 +1577,7 @@
             <a:fld id="{FBF54567-0DE4-3F47-BF90-CB84690072F9}" type="datetimeFigureOut">
               <a:rPr lang="en-US" dirty="0"/>
               <a:pPr/>
-              <a:t>6/20/2019</a:t>
+              <a:t>6/26/2019</a:t>
             </a:fld>
             <a:endParaRPr lang="en-US" dirty="0"/>
           </a:p>
@@ -1718,7 +1728,7 @@
           <a:ln/>
           <a:extLst>
             <a:ext uri="{91240B29-F687-4f45-9708-019B960494DF}">
-              <a14:hiddenLine xmlns:a14="http://schemas.microsoft.com/office/drawing/2010/main" xmlns="" w="9525">
+              <a14:hiddenLine xmlns="" xmlns:a14="http://schemas.microsoft.com/office/drawing/2010/main" w="9525">
                 <a:solidFill>
                   <a:srgbClr val="000000"/>
                 </a:solidFill>
@@ -1837,7 +1847,7 @@
             <a:fld id="{C6C52C72-DE31-F449-A4ED-4C594FD91407}" type="datetimeFigureOut">
               <a:rPr lang="en-US" dirty="0"/>
               <a:pPr/>
-              <a:t>6/20/2019</a:t>
+              <a:t>6/26/2019</a:t>
             </a:fld>
             <a:endParaRPr lang="en-US" dirty="0"/>
           </a:p>
@@ -1990,7 +2000,7 @@
           <a:ln/>
           <a:extLst>
             <a:ext uri="{91240B29-F687-4f45-9708-019B960494DF}">
-              <a14:hiddenLine xmlns:a14="http://schemas.microsoft.com/office/drawing/2010/main" xmlns="" w="9525">
+              <a14:hiddenLine xmlns="" xmlns:a14="http://schemas.microsoft.com/office/drawing/2010/main" w="9525">
                 <a:solidFill>
                   <a:srgbClr val="000000"/>
                 </a:solidFill>
@@ -2119,7 +2129,7 @@
             <a:fld id="{ED62726E-379B-B349-9EED-81ED093FA806}" type="datetimeFigureOut">
               <a:rPr lang="en-US" dirty="0"/>
               <a:pPr/>
-              <a:t>6/20/2019</a:t>
+              <a:t>6/26/2019</a:t>
             </a:fld>
             <a:endParaRPr lang="en-US" dirty="0"/>
           </a:p>
@@ -2270,7 +2280,7 @@
           <a:ln/>
           <a:extLst>
             <a:ext uri="{91240B29-F687-4f45-9708-019B960494DF}">
-              <a14:hiddenLine xmlns:a14="http://schemas.microsoft.com/office/drawing/2010/main" xmlns="" w="9525">
+              <a14:hiddenLine xmlns="" xmlns:a14="http://schemas.microsoft.com/office/drawing/2010/main" w="9525">
                 <a:solidFill>
                   <a:srgbClr val="000000"/>
                 </a:solidFill>
@@ -2399,7 +2409,7 @@
             <a:fld id="{9B3A1323-8D79-1946-B0D7-40001CF92E9D}" type="datetimeFigureOut">
               <a:rPr lang="en-US" dirty="0"/>
               <a:pPr/>
-              <a:t>6/20/2019</a:t>
+              <a:t>6/26/2019</a:t>
             </a:fld>
             <a:endParaRPr lang="en-US" dirty="0"/>
           </a:p>
@@ -2739,7 +2749,7 @@
             <a:fld id="{8DFA1846-DA80-1C48-A609-854EA85C59AD}" type="datetimeFigureOut">
               <a:rPr lang="en-US" dirty="0"/>
               <a:pPr/>
-              <a:t>6/20/2019</a:t>
+              <a:t>6/26/2019</a:t>
             </a:fld>
             <a:endParaRPr lang="en-US" dirty="0"/>
           </a:p>
@@ -2890,7 +2900,7 @@
           <a:ln/>
           <a:extLst>
             <a:ext uri="{91240B29-F687-4f45-9708-019B960494DF}">
-              <a14:hiddenLine xmlns:a14="http://schemas.microsoft.com/office/drawing/2010/main" xmlns="" w="9525">
+              <a14:hiddenLine xmlns="" xmlns:a14="http://schemas.microsoft.com/office/drawing/2010/main" w="9525">
                 <a:solidFill>
                   <a:srgbClr val="000000"/>
                 </a:solidFill>
@@ -3075,7 +3085,7 @@
             <a:fld id="{57302355-E14B-8545-A8F8-0FE83CC9D524}" type="datetimeFigureOut">
               <a:rPr lang="en-US" dirty="0"/>
               <a:pPr/>
-              <a:t>6/20/2019</a:t>
+              <a:t>6/26/2019</a:t>
             </a:fld>
             <a:endParaRPr lang="en-US" dirty="0"/>
           </a:p>
@@ -3226,7 +3236,7 @@
           <a:ln/>
           <a:extLst>
             <a:ext uri="{91240B29-F687-4f45-9708-019B960494DF}">
-              <a14:hiddenLine xmlns:a14="http://schemas.microsoft.com/office/drawing/2010/main" xmlns="" w="9525">
+              <a14:hiddenLine xmlns="" xmlns:a14="http://schemas.microsoft.com/office/drawing/2010/main" w="9525">
                 <a:solidFill>
                   <a:srgbClr val="000000"/>
                 </a:solidFill>
@@ -3549,7 +3559,7 @@
             <a:fld id="{02640F58-564D-2B4F-AE67-E407BA4FCF45}" type="datetimeFigureOut">
               <a:rPr lang="en-US" dirty="0"/>
               <a:pPr/>
-              <a:t>6/20/2019</a:t>
+              <a:t>6/26/2019</a:t>
             </a:fld>
             <a:endParaRPr lang="en-US" dirty="0"/>
           </a:p>
@@ -3700,7 +3710,7 @@
           <a:ln/>
           <a:extLst>
             <a:ext uri="{91240B29-F687-4f45-9708-019B960494DF}">
-              <a14:hiddenLine xmlns:a14="http://schemas.microsoft.com/office/drawing/2010/main" xmlns="" w="9525">
+              <a14:hiddenLine xmlns="" xmlns:a14="http://schemas.microsoft.com/office/drawing/2010/main" w="9525">
                 <a:solidFill>
                   <a:srgbClr val="000000"/>
                 </a:solidFill>
@@ -3767,7 +3777,7 @@
             <a:fld id="{F13A34C8-038E-2045-AF43-DF7DBB8E0E9E}" type="datetimeFigureOut">
               <a:rPr lang="en-US" dirty="0"/>
               <a:pPr/>
-              <a:t>6/20/2019</a:t>
+              <a:t>6/26/2019</a:t>
             </a:fld>
             <a:endParaRPr lang="en-US" dirty="0"/>
           </a:p>
@@ -3859,7 +3869,7 @@
             <a:fld id="{8818C68F-D26B-8F47-958C-23B49CF8A634}" type="datetimeFigureOut">
               <a:rPr lang="en-US" dirty="0"/>
               <a:pPr/>
-              <a:t>6/20/2019</a:t>
+              <a:t>6/26/2019</a:t>
             </a:fld>
             <a:endParaRPr lang="en-US" dirty="0"/>
           </a:p>
@@ -4123,7 +4133,7 @@
           <a:ln/>
           <a:extLst>
             <a:ext uri="{91240B29-F687-4f45-9708-019B960494DF}">
-              <a14:hiddenLine xmlns:a14="http://schemas.microsoft.com/office/drawing/2010/main" xmlns="" w="9525">
+              <a14:hiddenLine xmlns="" xmlns:a14="http://schemas.microsoft.com/office/drawing/2010/main" w="9525">
                 <a:solidFill>
                   <a:srgbClr val="000000"/>
                 </a:solidFill>
@@ -4323,7 +4333,7 @@
             <a:fld id="{D0DF5E60-9974-AC48-9591-99C2BB44B7CF}" type="datetimeFigureOut">
               <a:rPr lang="en-US" dirty="0"/>
               <a:pPr/>
-              <a:t>6/20/2019</a:t>
+              <a:t>6/26/2019</a:t>
             </a:fld>
             <a:endParaRPr lang="en-US" dirty="0"/>
           </a:p>
@@ -4633,7 +4643,7 @@
             <a:fld id="{18C79C5D-2A6F-F04D-97DA-BEF2467B64E4}" type="datetimeFigureOut">
               <a:rPr lang="en-US" dirty="0"/>
               <a:pPr/>
-              <a:t>6/20/2019</a:t>
+              <a:t>6/26/2019</a:t>
             </a:fld>
             <a:endParaRPr lang="en-US" dirty="0"/>
           </a:p>
@@ -4900,7 +4910,7 @@
             <a:fld id="{09B482E8-6E0E-1B4F-B1FD-C69DB9E858D9}" type="datetimeFigureOut">
               <a:rPr lang="en-US" dirty="0"/>
               <a:pPr/>
-              <a:t>6/20/2019</a:t>
+              <a:t>6/26/2019</a:t>
             </a:fld>
             <a:endParaRPr lang="en-US" dirty="0"/>
           </a:p>
@@ -5473,6 +5483,357 @@
 </p:sld>
 </file>
 
+<file path=ppt/slides/slide10.xml><?xml version="1.0" encoding="utf-8"?>
+<p:sld xmlns:a="http://schemas.openxmlformats.org/drawingml/2006/main" xmlns:r="http://schemas.openxmlformats.org/officeDocument/2006/relationships" xmlns:p="http://schemas.openxmlformats.org/presentationml/2006/main">
+  <p:cSld>
+    <p:spTree>
+      <p:nvGrpSpPr>
+        <p:cNvPr id="1" name=""/>
+        <p:cNvGrpSpPr/>
+        <p:nvPr/>
+      </p:nvGrpSpPr>
+      <p:grpSpPr>
+        <a:xfrm>
+          <a:off x="0" y="0"/>
+          <a:ext cx="0" cy="0"/>
+          <a:chOff x="0" y="0"/>
+          <a:chExt cx="0" cy="0"/>
+        </a:xfrm>
+      </p:grpSpPr>
+      <p:sp>
+        <p:nvSpPr>
+          <p:cNvPr id="2" name="Título 1">
+            <a:extLst>
+              <a:ext uri="{FF2B5EF4-FFF2-40B4-BE49-F238E27FC236}">
+                <a16:creationId xmlns:a16="http://schemas.microsoft.com/office/drawing/2014/main" id="{17E34C5E-0366-4A76-AAAB-6E87F283EC4F}"/>
+              </a:ext>
+            </a:extLst>
+          </p:cNvPr>
+          <p:cNvSpPr>
+            <a:spLocks noGrp="1"/>
+          </p:cNvSpPr>
+          <p:nvPr>
+            <p:ph type="title"/>
+          </p:nvPr>
+        </p:nvSpPr>
+        <p:spPr/>
+        <p:txBody>
+          <a:bodyPr/>
+          <a:lstStyle/>
+          <a:p>
+            <a:r>
+              <a:rPr lang="pt-BR" dirty="0"/>
+              <a:t>Programa</a:t>
+            </a:r>
+          </a:p>
+        </p:txBody>
+      </p:sp>
+      <p:sp>
+        <p:nvSpPr>
+          <p:cNvPr id="3" name="Espaço Reservado para Conteúdo 2">
+            <a:extLst>
+              <a:ext uri="{FF2B5EF4-FFF2-40B4-BE49-F238E27FC236}">
+                <a16:creationId xmlns:a16="http://schemas.microsoft.com/office/drawing/2014/main" id="{3AA453CF-8F18-4D02-95BE-47B22480E8AD}"/>
+              </a:ext>
+            </a:extLst>
+          </p:cNvPr>
+          <p:cNvSpPr>
+            <a:spLocks noGrp="1"/>
+          </p:cNvSpPr>
+          <p:nvPr>
+            <p:ph idx="1"/>
+          </p:nvPr>
+        </p:nvSpPr>
+        <p:spPr/>
+        <p:txBody>
+          <a:bodyPr/>
+          <a:lstStyle/>
+          <a:p>
+            <a:endParaRPr lang="pt-BR" dirty="0"/>
+          </a:p>
+        </p:txBody>
+      </p:sp>
+      <p:pic>
+        <p:nvPicPr>
+          <p:cNvPr id="4" name="Imagem 3">
+            <a:extLst>
+              <a:ext uri="{FF2B5EF4-FFF2-40B4-BE49-F238E27FC236}">
+                <a16:creationId xmlns:a16="http://schemas.microsoft.com/office/drawing/2014/main" id="{DBDDBBFB-834A-4002-B37F-5354637966EF}"/>
+              </a:ext>
+            </a:extLst>
+          </p:cNvPr>
+          <p:cNvPicPr>
+            <a:picLocks noChangeAspect="1"/>
+          </p:cNvPicPr>
+          <p:nvPr/>
+        </p:nvPicPr>
+        <p:blipFill>
+          <a:blip r:embed="rId2"/>
+          <a:stretch>
+            <a:fillRect/>
+          </a:stretch>
+        </p:blipFill>
+        <p:spPr>
+          <a:xfrm>
+            <a:off x="1459444" y="2588268"/>
+            <a:ext cx="4185976" cy="2971831"/>
+          </a:xfrm>
+          <a:prstGeom prst="rect">
+            <a:avLst/>
+          </a:prstGeom>
+        </p:spPr>
+      </p:pic>
+      <p:pic>
+        <p:nvPicPr>
+          <p:cNvPr id="5" name="Imagem 4">
+            <a:extLst>
+              <a:ext uri="{FF2B5EF4-FFF2-40B4-BE49-F238E27FC236}">
+                <a16:creationId xmlns:a16="http://schemas.microsoft.com/office/drawing/2014/main" id="{86921B47-65AC-4AD4-A844-A9CFE0E25E78}"/>
+              </a:ext>
+            </a:extLst>
+          </p:cNvPr>
+          <p:cNvPicPr>
+            <a:picLocks noChangeAspect="1"/>
+          </p:cNvPicPr>
+          <p:nvPr/>
+        </p:nvPicPr>
+        <p:blipFill>
+          <a:blip r:embed="rId3"/>
+          <a:stretch>
+            <a:fillRect/>
+          </a:stretch>
+        </p:blipFill>
+        <p:spPr>
+          <a:xfrm>
+            <a:off x="6286151" y="2554626"/>
+            <a:ext cx="4282261" cy="3005473"/>
+          </a:xfrm>
+          <a:prstGeom prst="rect">
+            <a:avLst/>
+          </a:prstGeom>
+        </p:spPr>
+      </p:pic>
+    </p:spTree>
+    <p:extLst>
+      <p:ext uri="{BB962C8B-B14F-4D97-AF65-F5344CB8AC3E}">
+        <p14:creationId xmlns:p14="http://schemas.microsoft.com/office/powerpoint/2010/main" val="644742575"/>
+      </p:ext>
+    </p:extLst>
+  </p:cSld>
+  <p:clrMapOvr>
+    <a:masterClrMapping/>
+  </p:clrMapOvr>
+</p:sld>
+</file>
+
+<file path=ppt/slides/slide11.xml><?xml version="1.0" encoding="utf-8"?>
+<p:sld xmlns:a="http://schemas.openxmlformats.org/drawingml/2006/main" xmlns:r="http://schemas.openxmlformats.org/officeDocument/2006/relationships" xmlns:p="http://schemas.openxmlformats.org/presentationml/2006/main">
+  <p:cSld>
+    <p:spTree>
+      <p:nvGrpSpPr>
+        <p:cNvPr id="1" name=""/>
+        <p:cNvGrpSpPr/>
+        <p:nvPr/>
+      </p:nvGrpSpPr>
+      <p:grpSpPr>
+        <a:xfrm>
+          <a:off x="0" y="0"/>
+          <a:ext cx="0" cy="0"/>
+          <a:chOff x="0" y="0"/>
+          <a:chExt cx="0" cy="0"/>
+        </a:xfrm>
+      </p:grpSpPr>
+      <p:sp>
+        <p:nvSpPr>
+          <p:cNvPr id="2" name="Título 1">
+            <a:extLst>
+              <a:ext uri="{FF2B5EF4-FFF2-40B4-BE49-F238E27FC236}">
+                <a16:creationId xmlns:a16="http://schemas.microsoft.com/office/drawing/2014/main" id="{3AD08319-6D73-41EC-9351-6EEF2CCAA77B}"/>
+              </a:ext>
+            </a:extLst>
+          </p:cNvPr>
+          <p:cNvSpPr>
+            <a:spLocks noGrp="1"/>
+          </p:cNvSpPr>
+          <p:nvPr>
+            <p:ph type="title"/>
+          </p:nvPr>
+        </p:nvSpPr>
+        <p:spPr/>
+        <p:txBody>
+          <a:bodyPr/>
+          <a:lstStyle/>
+          <a:p>
+            <a:endParaRPr lang="pt-BR" dirty="0"/>
+          </a:p>
+        </p:txBody>
+      </p:sp>
+      <p:sp>
+        <p:nvSpPr>
+          <p:cNvPr id="3" name="Espaço Reservado para Conteúdo 2">
+            <a:extLst>
+              <a:ext uri="{FF2B5EF4-FFF2-40B4-BE49-F238E27FC236}">
+                <a16:creationId xmlns:a16="http://schemas.microsoft.com/office/drawing/2014/main" id="{58AA3E69-6620-41F3-8F0D-5ABAC139D7EE}"/>
+              </a:ext>
+            </a:extLst>
+          </p:cNvPr>
+          <p:cNvSpPr>
+            <a:spLocks noGrp="1"/>
+          </p:cNvSpPr>
+          <p:nvPr>
+            <p:ph idx="1"/>
+          </p:nvPr>
+        </p:nvSpPr>
+        <p:spPr/>
+        <p:txBody>
+          <a:bodyPr/>
+          <a:lstStyle/>
+          <a:p>
+            <a:endParaRPr lang="pt-BR" dirty="0"/>
+          </a:p>
+        </p:txBody>
+      </p:sp>
+      <p:pic>
+        <p:nvPicPr>
+          <p:cNvPr id="4" name="Imagem 3">
+            <a:extLst>
+              <a:ext uri="{FF2B5EF4-FFF2-40B4-BE49-F238E27FC236}">
+                <a16:creationId xmlns:a16="http://schemas.microsoft.com/office/drawing/2014/main" id="{1601541F-9EF4-4D33-9AD8-6476C203CB20}"/>
+              </a:ext>
+            </a:extLst>
+          </p:cNvPr>
+          <p:cNvPicPr>
+            <a:picLocks noChangeAspect="1"/>
+          </p:cNvPicPr>
+          <p:nvPr/>
+        </p:nvPicPr>
+        <p:blipFill>
+          <a:blip r:embed="rId2"/>
+          <a:stretch>
+            <a:fillRect/>
+          </a:stretch>
+        </p:blipFill>
+        <p:spPr>
+          <a:xfrm>
+            <a:off x="1338830" y="2517654"/>
+            <a:ext cx="4021736" cy="2840857"/>
+          </a:xfrm>
+          <a:prstGeom prst="rect">
+            <a:avLst/>
+          </a:prstGeom>
+        </p:spPr>
+      </p:pic>
+      <p:pic>
+        <p:nvPicPr>
+          <p:cNvPr id="5" name="Imagem 4">
+            <a:extLst>
+              <a:ext uri="{FF2B5EF4-FFF2-40B4-BE49-F238E27FC236}">
+                <a16:creationId xmlns:a16="http://schemas.microsoft.com/office/drawing/2014/main" id="{E9DB50B8-CE9B-4299-A6F5-3584E6F4CD74}"/>
+              </a:ext>
+            </a:extLst>
+          </p:cNvPr>
+          <p:cNvPicPr>
+            <a:picLocks noChangeAspect="1"/>
+          </p:cNvPicPr>
+          <p:nvPr/>
+        </p:nvPicPr>
+        <p:blipFill>
+          <a:blip r:embed="rId3"/>
+          <a:stretch>
+            <a:fillRect/>
+          </a:stretch>
+        </p:blipFill>
+        <p:spPr>
+          <a:xfrm>
+            <a:off x="6451133" y="2586309"/>
+            <a:ext cx="4085439" cy="2879000"/>
+          </a:xfrm>
+          <a:prstGeom prst="rect">
+            <a:avLst/>
+          </a:prstGeom>
+        </p:spPr>
+      </p:pic>
+    </p:spTree>
+    <p:extLst>
+      <p:ext uri="{BB962C8B-B14F-4D97-AF65-F5344CB8AC3E}">
+        <p14:creationId xmlns:p14="http://schemas.microsoft.com/office/powerpoint/2010/main" val="1993931600"/>
+      </p:ext>
+    </p:extLst>
+  </p:cSld>
+  <p:clrMapOvr>
+    <a:masterClrMapping/>
+  </p:clrMapOvr>
+</p:sld>
+</file>
+
+<file path=ppt/slides/slide12.xml><?xml version="1.0" encoding="utf-8"?>
+<p:sld xmlns:a="http://schemas.openxmlformats.org/drawingml/2006/main" xmlns:r="http://schemas.openxmlformats.org/officeDocument/2006/relationships" xmlns:p="http://schemas.openxmlformats.org/presentationml/2006/main">
+  <p:cSld>
+    <p:spTree>
+      <p:nvGrpSpPr>
+        <p:cNvPr id="1" name=""/>
+        <p:cNvGrpSpPr/>
+        <p:nvPr/>
+      </p:nvGrpSpPr>
+      <p:grpSpPr>
+        <a:xfrm>
+          <a:off x="0" y="0"/>
+          <a:ext cx="0" cy="0"/>
+          <a:chOff x="0" y="0"/>
+          <a:chExt cx="0" cy="0"/>
+        </a:xfrm>
+      </p:grpSpPr>
+      <p:sp>
+        <p:nvSpPr>
+          <p:cNvPr id="6" name="CaixaDeTexto 5">
+            <a:extLst>
+              <a:ext uri="{FF2B5EF4-FFF2-40B4-BE49-F238E27FC236}">
+                <a16:creationId xmlns:a16="http://schemas.microsoft.com/office/drawing/2014/main" id="{765E9170-7A3E-4989-97A8-4613C3B7BCA8}"/>
+              </a:ext>
+            </a:extLst>
+          </p:cNvPr>
+          <p:cNvSpPr txBox="1"/>
+          <p:nvPr/>
+        </p:nvSpPr>
+        <p:spPr>
+          <a:xfrm>
+            <a:off x="2416029" y="1434517"/>
+            <a:ext cx="7055142" cy="3046988"/>
+          </a:xfrm>
+          <a:prstGeom prst="rect">
+            <a:avLst/>
+          </a:prstGeom>
+          <a:noFill/>
+        </p:spPr>
+        <p:txBody>
+          <a:bodyPr wrap="square" rtlCol="0">
+            <a:spAutoFit/>
+          </a:bodyPr>
+          <a:lstStyle/>
+          <a:p>
+            <a:endParaRPr lang="pt-BR" sz="9600" dirty="0"/>
+          </a:p>
+          <a:p>
+            <a:r>
+              <a:rPr lang="pt-BR" sz="9600" dirty="0"/>
+              <a:t>Conclusão</a:t>
+            </a:r>
+          </a:p>
+        </p:txBody>
+      </p:sp>
+    </p:spTree>
+    <p:extLst>
+      <p:ext uri="{BB962C8B-B14F-4D97-AF65-F5344CB8AC3E}">
+        <p14:creationId xmlns:p14="http://schemas.microsoft.com/office/powerpoint/2010/main" val="3219344695"/>
+      </p:ext>
+    </p:extLst>
+  </p:cSld>
+  <p:clrMapOvr>
+    <a:masterClrMapping/>
+  </p:clrMapOvr>
+</p:sld>
+</file>
+
 <file path=ppt/slides/slide2.xml><?xml version="1.0" encoding="utf-8"?>
 <p:sld xmlns:a="http://schemas.openxmlformats.org/drawingml/2006/main" xmlns:r="http://schemas.openxmlformats.org/officeDocument/2006/relationships" xmlns:p="http://schemas.openxmlformats.org/presentationml/2006/main">
   <p:cSld>
@@ -5693,7 +6054,7 @@
           <p:cNvPr id="2" name="Título 1">
             <a:extLst>
               <a:ext uri="{FF2B5EF4-FFF2-40B4-BE49-F238E27FC236}">
-                <a16:creationId xmlns:a16="http://schemas.microsoft.com/office/drawing/2014/main" id="{0E6AE7C7-429C-4D82-8706-252C85520487}"/>
+                <a16:creationId xmlns:a16="http://schemas.microsoft.com/office/drawing/2014/main" id="{0B25B320-2B6A-41D9-879D-0BF8E270F399}"/>
               </a:ext>
             </a:extLst>
           </p:cNvPr>
@@ -5711,114 +6072,40 @@
           <a:p>
             <a:r>
               <a:rPr lang="pt-BR" dirty="0"/>
-              <a:t>Projeto Conceitual</a:t>
-            </a:r>
-          </a:p>
-        </p:txBody>
-      </p:sp>
-      <p:pic>
-        <p:nvPicPr>
-          <p:cNvPr id="5" name="Espaço Reservado para Conteúdo 4">
+              <a:t>Requisitos Funcionais</a:t>
+            </a:r>
+          </a:p>
+        </p:txBody>
+      </p:sp>
+      <p:sp>
+        <p:nvSpPr>
+          <p:cNvPr id="3" name="Espaço Reservado para Conteúdo 2">
             <a:extLst>
               <a:ext uri="{FF2B5EF4-FFF2-40B4-BE49-F238E27FC236}">
-                <a16:creationId xmlns:a16="http://schemas.microsoft.com/office/drawing/2014/main" id="{807BAEDD-DE30-48BC-8A49-DE2D5EE5238C}"/>
+                <a16:creationId xmlns:a16="http://schemas.microsoft.com/office/drawing/2014/main" id="{442F8FC5-CE1B-49BC-BA66-5C8C4B64E4E0}"/>
               </a:ext>
             </a:extLst>
           </p:cNvPr>
-          <p:cNvPicPr>
-            <a:picLocks noGrp="1" noChangeAspect="1"/>
-          </p:cNvPicPr>
+          <p:cNvSpPr>
+            <a:spLocks noGrp="1"/>
+          </p:cNvSpPr>
           <p:nvPr>
             <p:ph idx="1"/>
           </p:nvPr>
-        </p:nvPicPr>
-        <p:blipFill>
-          <a:blip r:embed="rId2"/>
-          <a:stretch>
-            <a:fillRect/>
-          </a:stretch>
-        </p:blipFill>
-        <p:spPr>
-          <a:xfrm>
-            <a:off x="5163378" y="2642532"/>
-            <a:ext cx="5438444" cy="3015595"/>
-          </a:xfrm>
-        </p:spPr>
-      </p:pic>
-      <p:sp>
-        <p:nvSpPr>
-          <p:cNvPr id="6" name="CaixaDeTexto 5">
-            <a:extLst>
-              <a:ext uri="{FF2B5EF4-FFF2-40B4-BE49-F238E27FC236}">
-                <a16:creationId xmlns:a16="http://schemas.microsoft.com/office/drawing/2014/main" id="{C160C0C3-5559-495B-81FB-1B383D394E48}"/>
-              </a:ext>
-            </a:extLst>
-          </p:cNvPr>
-          <p:cNvSpPr txBox="1"/>
-          <p:nvPr/>
-        </p:nvSpPr>
-        <p:spPr>
-          <a:xfrm>
-            <a:off x="419450" y="3129094"/>
-            <a:ext cx="3565321" cy="1477328"/>
-          </a:xfrm>
-          <a:prstGeom prst="rect">
-            <a:avLst/>
-          </a:prstGeom>
-          <a:noFill/>
-        </p:spPr>
-        <p:txBody>
-          <a:bodyPr wrap="square" rtlCol="0">
-            <a:spAutoFit/>
-          </a:bodyPr>
-          <a:lstStyle/>
-          <a:p>
-            <a:pPr marL="285750" indent="-285750">
-              <a:buFontTx/>
-              <a:buChar char="-"/>
-            </a:pPr>
-            <a:r>
-              <a:rPr lang="pt-BR" dirty="0"/>
-              <a:t>Definição</a:t>
-            </a:r>
-          </a:p>
-          <a:p>
-            <a:pPr marL="285750" indent="-285750">
-              <a:buFontTx/>
-              <a:buChar char="-"/>
-            </a:pPr>
-            <a:endParaRPr lang="pt-BR" dirty="0"/>
-          </a:p>
-          <a:p>
-            <a:pPr marL="285750" indent="-285750">
-              <a:buFontTx/>
-              <a:buChar char="-"/>
-            </a:pPr>
-            <a:endParaRPr lang="pt-BR" dirty="0"/>
-          </a:p>
-          <a:p>
-            <a:pPr marL="285750" indent="-285750">
-              <a:buFontTx/>
-              <a:buChar char="-"/>
-            </a:pPr>
-            <a:r>
-              <a:rPr lang="pt-BR" dirty="0"/>
-              <a:t>Relacionamentos</a:t>
-            </a:r>
-          </a:p>
-          <a:p>
-            <a:pPr marL="285750" indent="-285750">
-              <a:buFontTx/>
-              <a:buChar char="-"/>
-            </a:pPr>
-            <a:endParaRPr lang="pt-BR" dirty="0"/>
+        </p:nvSpPr>
+        <p:spPr/>
+        <p:txBody>
+          <a:bodyPr/>
+          <a:lstStyle/>
+          <a:p>
+            <a:endParaRPr lang="pt-BR"/>
           </a:p>
         </p:txBody>
       </p:sp>
     </p:spTree>
     <p:extLst>
       <p:ext uri="{BB962C8B-B14F-4D97-AF65-F5344CB8AC3E}">
-        <p14:creationId xmlns:p14="http://schemas.microsoft.com/office/powerpoint/2010/main" val="233419460"/>
+        <p14:creationId xmlns:p14="http://schemas.microsoft.com/office/powerpoint/2010/main" val="2917994725"/>
       </p:ext>
     </p:extLst>
   </p:cSld>
@@ -5850,6 +6137,329 @@
           <p:cNvPr id="2" name="Título 1">
             <a:extLst>
               <a:ext uri="{FF2B5EF4-FFF2-40B4-BE49-F238E27FC236}">
+                <a16:creationId xmlns:a16="http://schemas.microsoft.com/office/drawing/2014/main" id="{CB1253F6-22EC-4B6D-B73D-245372A3C968}"/>
+              </a:ext>
+            </a:extLst>
+          </p:cNvPr>
+          <p:cNvSpPr>
+            <a:spLocks noGrp="1"/>
+          </p:cNvSpPr>
+          <p:nvPr>
+            <p:ph type="title"/>
+          </p:nvPr>
+        </p:nvSpPr>
+        <p:spPr/>
+        <p:txBody>
+          <a:bodyPr/>
+          <a:lstStyle/>
+          <a:p>
+            <a:r>
+              <a:rPr lang="pt-BR" dirty="0"/>
+              <a:t>Diagrama de Casos de Uso</a:t>
+            </a:r>
+          </a:p>
+        </p:txBody>
+      </p:sp>
+      <p:sp>
+        <p:nvSpPr>
+          <p:cNvPr id="3" name="Espaço Reservado para Conteúdo 2">
+            <a:extLst>
+              <a:ext uri="{FF2B5EF4-FFF2-40B4-BE49-F238E27FC236}">
+                <a16:creationId xmlns:a16="http://schemas.microsoft.com/office/drawing/2014/main" id="{D573CF33-D255-47CE-8AB9-639834EDD0E2}"/>
+              </a:ext>
+            </a:extLst>
+          </p:cNvPr>
+          <p:cNvSpPr>
+            <a:spLocks noGrp="1"/>
+          </p:cNvSpPr>
+          <p:nvPr>
+            <p:ph idx="1"/>
+          </p:nvPr>
+        </p:nvSpPr>
+        <p:spPr/>
+        <p:txBody>
+          <a:bodyPr/>
+          <a:lstStyle/>
+          <a:p>
+            <a:endParaRPr lang="pt-BR"/>
+          </a:p>
+        </p:txBody>
+      </p:sp>
+    </p:spTree>
+    <p:extLst>
+      <p:ext uri="{BB962C8B-B14F-4D97-AF65-F5344CB8AC3E}">
+        <p14:creationId xmlns:p14="http://schemas.microsoft.com/office/powerpoint/2010/main" val="2881832106"/>
+      </p:ext>
+    </p:extLst>
+  </p:cSld>
+  <p:clrMapOvr>
+    <a:masterClrMapping/>
+  </p:clrMapOvr>
+</p:sld>
+</file>
+
+<file path=ppt/slides/slide5.xml><?xml version="1.0" encoding="utf-8"?>
+<p:sld xmlns:a="http://schemas.openxmlformats.org/drawingml/2006/main" xmlns:r="http://schemas.openxmlformats.org/officeDocument/2006/relationships" xmlns:p="http://schemas.openxmlformats.org/presentationml/2006/main">
+  <p:cSld>
+    <p:spTree>
+      <p:nvGrpSpPr>
+        <p:cNvPr id="1" name=""/>
+        <p:cNvGrpSpPr/>
+        <p:nvPr/>
+      </p:nvGrpSpPr>
+      <p:grpSpPr>
+        <a:xfrm>
+          <a:off x="0" y="0"/>
+          <a:ext cx="0" cy="0"/>
+          <a:chOff x="0" y="0"/>
+          <a:chExt cx="0" cy="0"/>
+        </a:xfrm>
+      </p:grpSpPr>
+      <p:sp>
+        <p:nvSpPr>
+          <p:cNvPr id="2" name="Título 1">
+            <a:extLst>
+              <a:ext uri="{FF2B5EF4-FFF2-40B4-BE49-F238E27FC236}">
+                <a16:creationId xmlns:a16="http://schemas.microsoft.com/office/drawing/2014/main" id="{B1101042-8D52-4C82-B062-772AB72C0A79}"/>
+              </a:ext>
+            </a:extLst>
+          </p:cNvPr>
+          <p:cNvSpPr>
+            <a:spLocks noGrp="1"/>
+          </p:cNvSpPr>
+          <p:nvPr>
+            <p:ph type="title"/>
+          </p:nvPr>
+        </p:nvSpPr>
+        <p:spPr/>
+        <p:txBody>
+          <a:bodyPr/>
+          <a:lstStyle/>
+          <a:p>
+            <a:r>
+              <a:rPr lang="pt-BR" dirty="0"/>
+              <a:t>Diagrama de Classes</a:t>
+            </a:r>
+          </a:p>
+        </p:txBody>
+      </p:sp>
+      <p:sp>
+        <p:nvSpPr>
+          <p:cNvPr id="3" name="Espaço Reservado para Conteúdo 2">
+            <a:extLst>
+              <a:ext uri="{FF2B5EF4-FFF2-40B4-BE49-F238E27FC236}">
+                <a16:creationId xmlns:a16="http://schemas.microsoft.com/office/drawing/2014/main" id="{66676F0F-069F-4D7A-BE4C-06A323F96F6F}"/>
+              </a:ext>
+            </a:extLst>
+          </p:cNvPr>
+          <p:cNvSpPr>
+            <a:spLocks noGrp="1"/>
+          </p:cNvSpPr>
+          <p:nvPr>
+            <p:ph idx="1"/>
+          </p:nvPr>
+        </p:nvSpPr>
+        <p:spPr/>
+        <p:txBody>
+          <a:bodyPr/>
+          <a:lstStyle/>
+          <a:p>
+            <a:endParaRPr lang="pt-BR"/>
+          </a:p>
+        </p:txBody>
+      </p:sp>
+    </p:spTree>
+    <p:extLst>
+      <p:ext uri="{BB962C8B-B14F-4D97-AF65-F5344CB8AC3E}">
+        <p14:creationId xmlns:p14="http://schemas.microsoft.com/office/powerpoint/2010/main" val="1706480695"/>
+      </p:ext>
+    </p:extLst>
+  </p:cSld>
+  <p:clrMapOvr>
+    <a:masterClrMapping/>
+  </p:clrMapOvr>
+</p:sld>
+</file>
+
+<file path=ppt/slides/slide6.xml><?xml version="1.0" encoding="utf-8"?>
+<p:sld xmlns:a="http://schemas.openxmlformats.org/drawingml/2006/main" xmlns:r="http://schemas.openxmlformats.org/officeDocument/2006/relationships" xmlns:p="http://schemas.openxmlformats.org/presentationml/2006/main">
+  <p:cSld>
+    <p:spTree>
+      <p:nvGrpSpPr>
+        <p:cNvPr id="1" name=""/>
+        <p:cNvGrpSpPr/>
+        <p:nvPr/>
+      </p:nvGrpSpPr>
+      <p:grpSpPr>
+        <a:xfrm>
+          <a:off x="0" y="0"/>
+          <a:ext cx="0" cy="0"/>
+          <a:chOff x="0" y="0"/>
+          <a:chExt cx="0" cy="0"/>
+        </a:xfrm>
+      </p:grpSpPr>
+      <p:sp>
+        <p:nvSpPr>
+          <p:cNvPr id="2" name="Título 1">
+            <a:extLst>
+              <a:ext uri="{FF2B5EF4-FFF2-40B4-BE49-F238E27FC236}">
+                <a16:creationId xmlns:a16="http://schemas.microsoft.com/office/drawing/2014/main" id="{0E6AE7C7-429C-4D82-8706-252C85520487}"/>
+              </a:ext>
+            </a:extLst>
+          </p:cNvPr>
+          <p:cNvSpPr>
+            <a:spLocks noGrp="1"/>
+          </p:cNvSpPr>
+          <p:nvPr>
+            <p:ph type="title"/>
+          </p:nvPr>
+        </p:nvSpPr>
+        <p:spPr/>
+        <p:txBody>
+          <a:bodyPr/>
+          <a:lstStyle/>
+          <a:p>
+            <a:r>
+              <a:rPr lang="pt-BR" dirty="0"/>
+              <a:t>Projeto Conceitual</a:t>
+            </a:r>
+          </a:p>
+        </p:txBody>
+      </p:sp>
+      <p:pic>
+        <p:nvPicPr>
+          <p:cNvPr id="5" name="Espaço Reservado para Conteúdo 4">
+            <a:extLst>
+              <a:ext uri="{FF2B5EF4-FFF2-40B4-BE49-F238E27FC236}">
+                <a16:creationId xmlns:a16="http://schemas.microsoft.com/office/drawing/2014/main" id="{807BAEDD-DE30-48BC-8A49-DE2D5EE5238C}"/>
+              </a:ext>
+            </a:extLst>
+          </p:cNvPr>
+          <p:cNvPicPr>
+            <a:picLocks noGrp="1" noChangeAspect="1"/>
+          </p:cNvPicPr>
+          <p:nvPr>
+            <p:ph idx="1"/>
+          </p:nvPr>
+        </p:nvPicPr>
+        <p:blipFill>
+          <a:blip r:embed="rId2"/>
+          <a:stretch>
+            <a:fillRect/>
+          </a:stretch>
+        </p:blipFill>
+        <p:spPr>
+          <a:xfrm>
+            <a:off x="5163378" y="2642532"/>
+            <a:ext cx="5438444" cy="3015595"/>
+          </a:xfrm>
+        </p:spPr>
+      </p:pic>
+      <p:sp>
+        <p:nvSpPr>
+          <p:cNvPr id="6" name="CaixaDeTexto 5">
+            <a:extLst>
+              <a:ext uri="{FF2B5EF4-FFF2-40B4-BE49-F238E27FC236}">
+                <a16:creationId xmlns:a16="http://schemas.microsoft.com/office/drawing/2014/main" id="{C160C0C3-5559-495B-81FB-1B383D394E48}"/>
+              </a:ext>
+            </a:extLst>
+          </p:cNvPr>
+          <p:cNvSpPr txBox="1"/>
+          <p:nvPr/>
+        </p:nvSpPr>
+        <p:spPr>
+          <a:xfrm>
+            <a:off x="419450" y="3129094"/>
+            <a:ext cx="3565321" cy="1477328"/>
+          </a:xfrm>
+          <a:prstGeom prst="rect">
+            <a:avLst/>
+          </a:prstGeom>
+          <a:noFill/>
+        </p:spPr>
+        <p:txBody>
+          <a:bodyPr wrap="square" rtlCol="0">
+            <a:spAutoFit/>
+          </a:bodyPr>
+          <a:lstStyle/>
+          <a:p>
+            <a:pPr marL="285750" indent="-285750">
+              <a:buFontTx/>
+              <a:buChar char="-"/>
+            </a:pPr>
+            <a:r>
+              <a:rPr lang="pt-BR" dirty="0"/>
+              <a:t>Definição</a:t>
+            </a:r>
+          </a:p>
+          <a:p>
+            <a:pPr marL="285750" indent="-285750">
+              <a:buFontTx/>
+              <a:buChar char="-"/>
+            </a:pPr>
+            <a:endParaRPr lang="pt-BR" dirty="0"/>
+          </a:p>
+          <a:p>
+            <a:pPr marL="285750" indent="-285750">
+              <a:buFontTx/>
+              <a:buChar char="-"/>
+            </a:pPr>
+            <a:endParaRPr lang="pt-BR" dirty="0"/>
+          </a:p>
+          <a:p>
+            <a:pPr marL="285750" indent="-285750">
+              <a:buFontTx/>
+              <a:buChar char="-"/>
+            </a:pPr>
+            <a:r>
+              <a:rPr lang="pt-BR" dirty="0"/>
+              <a:t>Relacionamentos</a:t>
+            </a:r>
+          </a:p>
+          <a:p>
+            <a:pPr marL="285750" indent="-285750">
+              <a:buFontTx/>
+              <a:buChar char="-"/>
+            </a:pPr>
+            <a:endParaRPr lang="pt-BR" dirty="0"/>
+          </a:p>
+        </p:txBody>
+      </p:sp>
+    </p:spTree>
+    <p:extLst>
+      <p:ext uri="{BB962C8B-B14F-4D97-AF65-F5344CB8AC3E}">
+        <p14:creationId xmlns:p14="http://schemas.microsoft.com/office/powerpoint/2010/main" val="233419460"/>
+      </p:ext>
+    </p:extLst>
+  </p:cSld>
+  <p:clrMapOvr>
+    <a:masterClrMapping/>
+  </p:clrMapOvr>
+</p:sld>
+</file>
+
+<file path=ppt/slides/slide7.xml><?xml version="1.0" encoding="utf-8"?>
+<p:sld xmlns:a="http://schemas.openxmlformats.org/drawingml/2006/main" xmlns:r="http://schemas.openxmlformats.org/officeDocument/2006/relationships" xmlns:p="http://schemas.openxmlformats.org/presentationml/2006/main">
+  <p:cSld>
+    <p:spTree>
+      <p:nvGrpSpPr>
+        <p:cNvPr id="1" name=""/>
+        <p:cNvGrpSpPr/>
+        <p:nvPr/>
+      </p:nvGrpSpPr>
+      <p:grpSpPr>
+        <a:xfrm>
+          <a:off x="0" y="0"/>
+          <a:ext cx="0" cy="0"/>
+          <a:chOff x="0" y="0"/>
+          <a:chExt cx="0" cy="0"/>
+        </a:xfrm>
+      </p:grpSpPr>
+      <p:sp>
+        <p:nvSpPr>
+          <p:cNvPr id="2" name="Título 1">
+            <a:extLst>
+              <a:ext uri="{FF2B5EF4-FFF2-40B4-BE49-F238E27FC236}">
                 <a16:creationId xmlns:a16="http://schemas.microsoft.com/office/drawing/2014/main" id="{EDB08E1C-E6D9-4CD4-94EE-1BDB042CB2DC}"/>
               </a:ext>
             </a:extLst>
@@ -5978,7 +6588,7 @@
 </p:sld>
 </file>
 
-<file path=ppt/slides/slide5.xml><?xml version="1.0" encoding="utf-8"?>
+<file path=ppt/slides/slide8.xml><?xml version="1.0" encoding="utf-8"?>
 <p:sld xmlns:a="http://schemas.openxmlformats.org/drawingml/2006/main" xmlns:r="http://schemas.openxmlformats.org/officeDocument/2006/relationships" xmlns:p="http://schemas.openxmlformats.org/presentationml/2006/main">
   <p:cSld>
     <p:spTree>
@@ -6153,7 +6763,7 @@
 </p:sld>
 </file>
 
-<file path=ppt/slides/slide6.xml><?xml version="1.0" encoding="utf-8"?>
+<file path=ppt/slides/slide9.xml><?xml version="1.0" encoding="utf-8"?>
 <p:sld xmlns:a="http://schemas.openxmlformats.org/drawingml/2006/main" xmlns:r="http://schemas.openxmlformats.org/officeDocument/2006/relationships" xmlns:p="http://schemas.openxmlformats.org/presentationml/2006/main">
   <p:cSld>
     <p:spTree>
@@ -6310,78 +6920,40 @@
           </a:p>
         </p:txBody>
       </p:sp>
+      <p:pic>
+        <p:nvPicPr>
+          <p:cNvPr id="5" name="Imagem 4">
+            <a:extLst>
+              <a:ext uri="{FF2B5EF4-FFF2-40B4-BE49-F238E27FC236}">
+                <a16:creationId xmlns:a16="http://schemas.microsoft.com/office/drawing/2014/main" id="{448F401E-03AD-4941-9F51-B419F3F476BB}"/>
+              </a:ext>
+            </a:extLst>
+          </p:cNvPr>
+          <p:cNvPicPr>
+            <a:picLocks noChangeAspect="1"/>
+          </p:cNvPicPr>
+          <p:nvPr/>
+        </p:nvPicPr>
+        <p:blipFill>
+          <a:blip r:embed="rId2"/>
+          <a:stretch>
+            <a:fillRect/>
+          </a:stretch>
+        </p:blipFill>
+        <p:spPr>
+          <a:xfrm>
+            <a:off x="5423594" y="2379051"/>
+            <a:ext cx="4946489" cy="3181713"/>
+          </a:xfrm>
+          <a:prstGeom prst="rect">
+            <a:avLst/>
+          </a:prstGeom>
+        </p:spPr>
+      </p:pic>
     </p:spTree>
     <p:extLst>
       <p:ext uri="{BB962C8B-B14F-4D97-AF65-F5344CB8AC3E}">
         <p14:creationId xmlns:p14="http://schemas.microsoft.com/office/powerpoint/2010/main" val="2880436270"/>
-      </p:ext>
-    </p:extLst>
-  </p:cSld>
-  <p:clrMapOvr>
-    <a:masterClrMapping/>
-  </p:clrMapOvr>
-</p:sld>
-</file>
-
-<file path=ppt/slides/slide7.xml><?xml version="1.0" encoding="utf-8"?>
-<p:sld xmlns:a="http://schemas.openxmlformats.org/drawingml/2006/main" xmlns:r="http://schemas.openxmlformats.org/officeDocument/2006/relationships" xmlns:p="http://schemas.openxmlformats.org/presentationml/2006/main">
-  <p:cSld>
-    <p:spTree>
-      <p:nvGrpSpPr>
-        <p:cNvPr id="1" name=""/>
-        <p:cNvGrpSpPr/>
-        <p:nvPr/>
-      </p:nvGrpSpPr>
-      <p:grpSpPr>
-        <a:xfrm>
-          <a:off x="0" y="0"/>
-          <a:ext cx="0" cy="0"/>
-          <a:chOff x="0" y="0"/>
-          <a:chExt cx="0" cy="0"/>
-        </a:xfrm>
-      </p:grpSpPr>
-      <p:sp>
-        <p:nvSpPr>
-          <p:cNvPr id="6" name="CaixaDeTexto 5">
-            <a:extLst>
-              <a:ext uri="{FF2B5EF4-FFF2-40B4-BE49-F238E27FC236}">
-                <a16:creationId xmlns:a16="http://schemas.microsoft.com/office/drawing/2014/main" id="{765E9170-7A3E-4989-97A8-4613C3B7BCA8}"/>
-              </a:ext>
-            </a:extLst>
-          </p:cNvPr>
-          <p:cNvSpPr txBox="1"/>
-          <p:nvPr/>
-        </p:nvSpPr>
-        <p:spPr>
-          <a:xfrm>
-            <a:off x="2416029" y="1434517"/>
-            <a:ext cx="7055142" cy="3046988"/>
-          </a:xfrm>
-          <a:prstGeom prst="rect">
-            <a:avLst/>
-          </a:prstGeom>
-          <a:noFill/>
-        </p:spPr>
-        <p:txBody>
-          <a:bodyPr wrap="square" rtlCol="0">
-            <a:spAutoFit/>
-          </a:bodyPr>
-          <a:lstStyle/>
-          <a:p>
-            <a:endParaRPr lang="pt-BR" sz="9600" dirty="0"/>
-          </a:p>
-          <a:p>
-            <a:r>
-              <a:rPr lang="pt-BR" sz="9600" dirty="0"/>
-              <a:t>Conclusão</a:t>
-            </a:r>
-          </a:p>
-        </p:txBody>
-      </p:sp>
-    </p:spTree>
-    <p:extLst>
-      <p:ext uri="{BB962C8B-B14F-4D97-AF65-F5344CB8AC3E}">
-        <p14:creationId xmlns:p14="http://schemas.microsoft.com/office/powerpoint/2010/main" val="3219344695"/>
       </p:ext>
     </p:extLst>
   </p:cSld>

</xml_diff>

<commit_message>
Mudando um pouco os slides e deixando o código limpo
</commit_message>
<xml_diff>
--- a/IODware.pptx
+++ b/IODware.pptx
@@ -218,7 +218,7 @@
           <a:effectLst/>
           <a:extLst>
             <a:ext uri="{91240B29-F687-4f45-9708-019B960494DF}">
-              <a14:hiddenLine xmlns="" xmlns:a14="http://schemas.microsoft.com/office/drawing/2010/main" w="9525">
+              <a14:hiddenLine xmlns:a14="http://schemas.microsoft.com/office/drawing/2010/main" xmlns="" w="9525">
                 <a:solidFill>
                   <a:srgbClr val="000000"/>
                 </a:solidFill>
@@ -1728,7 +1728,7 @@
           <a:ln/>
           <a:extLst>
             <a:ext uri="{91240B29-F687-4f45-9708-019B960494DF}">
-              <a14:hiddenLine xmlns="" xmlns:a14="http://schemas.microsoft.com/office/drawing/2010/main" w="9525">
+              <a14:hiddenLine xmlns:a14="http://schemas.microsoft.com/office/drawing/2010/main" xmlns="" w="9525">
                 <a:solidFill>
                   <a:srgbClr val="000000"/>
                 </a:solidFill>
@@ -2000,7 +2000,7 @@
           <a:ln/>
           <a:extLst>
             <a:ext uri="{91240B29-F687-4f45-9708-019B960494DF}">
-              <a14:hiddenLine xmlns="" xmlns:a14="http://schemas.microsoft.com/office/drawing/2010/main" w="9525">
+              <a14:hiddenLine xmlns:a14="http://schemas.microsoft.com/office/drawing/2010/main" xmlns="" w="9525">
                 <a:solidFill>
                   <a:srgbClr val="000000"/>
                 </a:solidFill>
@@ -2280,7 +2280,7 @@
           <a:ln/>
           <a:extLst>
             <a:ext uri="{91240B29-F687-4f45-9708-019B960494DF}">
-              <a14:hiddenLine xmlns="" xmlns:a14="http://schemas.microsoft.com/office/drawing/2010/main" w="9525">
+              <a14:hiddenLine xmlns:a14="http://schemas.microsoft.com/office/drawing/2010/main" xmlns="" w="9525">
                 <a:solidFill>
                   <a:srgbClr val="000000"/>
                 </a:solidFill>
@@ -2900,7 +2900,7 @@
           <a:ln/>
           <a:extLst>
             <a:ext uri="{91240B29-F687-4f45-9708-019B960494DF}">
-              <a14:hiddenLine xmlns="" xmlns:a14="http://schemas.microsoft.com/office/drawing/2010/main" w="9525">
+              <a14:hiddenLine xmlns:a14="http://schemas.microsoft.com/office/drawing/2010/main" xmlns="" w="9525">
                 <a:solidFill>
                   <a:srgbClr val="000000"/>
                 </a:solidFill>
@@ -3236,7 +3236,7 @@
           <a:ln/>
           <a:extLst>
             <a:ext uri="{91240B29-F687-4f45-9708-019B960494DF}">
-              <a14:hiddenLine xmlns="" xmlns:a14="http://schemas.microsoft.com/office/drawing/2010/main" w="9525">
+              <a14:hiddenLine xmlns:a14="http://schemas.microsoft.com/office/drawing/2010/main" xmlns="" w="9525">
                 <a:solidFill>
                   <a:srgbClr val="000000"/>
                 </a:solidFill>
@@ -3710,7 +3710,7 @@
           <a:ln/>
           <a:extLst>
             <a:ext uri="{91240B29-F687-4f45-9708-019B960494DF}">
-              <a14:hiddenLine xmlns="" xmlns:a14="http://schemas.microsoft.com/office/drawing/2010/main" w="9525">
+              <a14:hiddenLine xmlns:a14="http://schemas.microsoft.com/office/drawing/2010/main" xmlns="" w="9525">
                 <a:solidFill>
                   <a:srgbClr val="000000"/>
                 </a:solidFill>
@@ -4133,7 +4133,7 @@
           <a:ln/>
           <a:extLst>
             <a:ext uri="{91240B29-F687-4f45-9708-019B960494DF}">
-              <a14:hiddenLine xmlns="" xmlns:a14="http://schemas.microsoft.com/office/drawing/2010/main" w="9525">
+              <a14:hiddenLine xmlns:a14="http://schemas.microsoft.com/office/drawing/2010/main" xmlns="" w="9525">
                 <a:solidFill>
                   <a:srgbClr val="000000"/>
                 </a:solidFill>
@@ -5664,7 +5664,10 @@
           <a:bodyPr/>
           <a:lstStyle/>
           <a:p>
-            <a:endParaRPr lang="pt-BR" dirty="0"/>
+            <a:r>
+              <a:rPr lang="pt-BR" dirty="0"/>
+              <a:t>Programa</a:t>
+            </a:r>
           </a:p>
         </p:txBody>
       </p:sp>

</xml_diff>